<commit_message>
Examples (ttc-2015-fuml-activity-diagrams, documentation): Updated solution presentation (camera-ready version).
</commit_message>
<xml_diff>
--- a/examples/ttc-2015-fuml-activity-diagrams/documentation/figures/solution-presentation.pptx
+++ b/examples/ttc-2015-fuml-activity-diagrams/documentation/figures/solution-presentation.pptx
@@ -5,7 +5,7 @@
     <p:sldMasterId id="2147483648" r:id="rId1"/>
   </p:sldMasterIdLst>
   <p:notesMasterIdLst>
-    <p:notesMasterId r:id="rId22"/>
+    <p:notesMasterId r:id="rId24"/>
   </p:notesMasterIdLst>
   <p:sldIdLst>
     <p:sldId id="256" r:id="rId2"/>
@@ -25,9 +25,11 @@
     <p:sldId id="277" r:id="rId16"/>
     <p:sldId id="278" r:id="rId17"/>
     <p:sldId id="262" r:id="rId18"/>
-    <p:sldId id="263" r:id="rId19"/>
+    <p:sldId id="289" r:id="rId19"/>
     <p:sldId id="264" r:id="rId20"/>
-    <p:sldId id="284" r:id="rId21"/>
+    <p:sldId id="263" r:id="rId21"/>
+    <p:sldId id="288" r:id="rId22"/>
+    <p:sldId id="286" r:id="rId23"/>
   </p:sldIdLst>
   <p:sldSz cx="9144000" cy="6858000" type="screen4x3"/>
   <p:notesSz cx="6858000" cy="9144000"/>
@@ -211,7 +213,7 @@
           <a:p>
             <a:fld id="{2DC44254-5F95-204D-8F07-2678B782EA19}" type="datetimeFigureOut">
               <a:rPr lang="en-US" smtClean="0"/>
-              <a:t>21/09/15</a:t>
+              <a:t>21/10/15</a:t>
             </a:fld>
             <a:endParaRPr lang="en-GB"/>
           </a:p>
@@ -796,7 +798,7 @@
           <a:p>
             <a:fld id="{62C7DB7A-D2BB-614B-B3DC-29EE0C91A468}" type="slidenum">
               <a:rPr lang="en-GB" smtClean="0"/>
-              <a:t>20</a:t>
+              <a:t>22</a:t>
             </a:fld>
             <a:endParaRPr lang="en-GB"/>
           </a:p>
@@ -996,7 +998,7 @@
           <a:p>
             <a:fld id="{9F50B6A4-EEFC-6D43-8633-B920B387D5FF}" type="datetimeFigureOut">
               <a:rPr lang="en-US" smtClean="0"/>
-              <a:t>21/09/15</a:t>
+              <a:t>21/10/15</a:t>
             </a:fld>
             <a:endParaRPr lang="en-GB"/>
           </a:p>
@@ -1166,7 +1168,7 @@
           <a:p>
             <a:fld id="{9F50B6A4-EEFC-6D43-8633-B920B387D5FF}" type="datetimeFigureOut">
               <a:rPr lang="en-US" smtClean="0"/>
-              <a:t>21/09/15</a:t>
+              <a:t>21/10/15</a:t>
             </a:fld>
             <a:endParaRPr lang="en-GB"/>
           </a:p>
@@ -1346,7 +1348,7 @@
           <a:p>
             <a:fld id="{9F50B6A4-EEFC-6D43-8633-B920B387D5FF}" type="datetimeFigureOut">
               <a:rPr lang="en-US" smtClean="0"/>
-              <a:t>21/09/15</a:t>
+              <a:t>21/10/15</a:t>
             </a:fld>
             <a:endParaRPr lang="en-GB"/>
           </a:p>
@@ -1516,7 +1518,7 @@
           <a:p>
             <a:fld id="{9F50B6A4-EEFC-6D43-8633-B920B387D5FF}" type="datetimeFigureOut">
               <a:rPr lang="en-US" smtClean="0"/>
-              <a:t>21/09/15</a:t>
+              <a:t>21/10/15</a:t>
             </a:fld>
             <a:endParaRPr lang="en-GB"/>
           </a:p>
@@ -1762,7 +1764,7 @@
           <a:p>
             <a:fld id="{9F50B6A4-EEFC-6D43-8633-B920B387D5FF}" type="datetimeFigureOut">
               <a:rPr lang="en-US" smtClean="0"/>
-              <a:t>21/09/15</a:t>
+              <a:t>21/10/15</a:t>
             </a:fld>
             <a:endParaRPr lang="en-GB"/>
           </a:p>
@@ -2050,7 +2052,7 @@
           <a:p>
             <a:fld id="{9F50B6A4-EEFC-6D43-8633-B920B387D5FF}" type="datetimeFigureOut">
               <a:rPr lang="en-US" smtClean="0"/>
-              <a:t>21/09/15</a:t>
+              <a:t>21/10/15</a:t>
             </a:fld>
             <a:endParaRPr lang="en-GB"/>
           </a:p>
@@ -2472,7 +2474,7 @@
           <a:p>
             <a:fld id="{9F50B6A4-EEFC-6D43-8633-B920B387D5FF}" type="datetimeFigureOut">
               <a:rPr lang="en-US" smtClean="0"/>
-              <a:t>21/09/15</a:t>
+              <a:t>21/10/15</a:t>
             </a:fld>
             <a:endParaRPr lang="en-GB"/>
           </a:p>
@@ -2590,7 +2592,7 @@
           <a:p>
             <a:fld id="{9F50B6A4-EEFC-6D43-8633-B920B387D5FF}" type="datetimeFigureOut">
               <a:rPr lang="en-US" smtClean="0"/>
-              <a:t>21/09/15</a:t>
+              <a:t>21/10/15</a:t>
             </a:fld>
             <a:endParaRPr lang="en-GB"/>
           </a:p>
@@ -2685,7 +2687,7 @@
           <a:p>
             <a:fld id="{9F50B6A4-EEFC-6D43-8633-B920B387D5FF}" type="datetimeFigureOut">
               <a:rPr lang="en-US" smtClean="0"/>
-              <a:t>21/09/15</a:t>
+              <a:t>21/10/15</a:t>
             </a:fld>
             <a:endParaRPr lang="en-GB"/>
           </a:p>
@@ -2962,7 +2964,7 @@
           <a:p>
             <a:fld id="{9F50B6A4-EEFC-6D43-8633-B920B387D5FF}" type="datetimeFigureOut">
               <a:rPr lang="en-US" smtClean="0"/>
-              <a:t>21/09/15</a:t>
+              <a:t>21/10/15</a:t>
             </a:fld>
             <a:endParaRPr lang="en-GB"/>
           </a:p>
@@ -3215,7 +3217,7 @@
           <a:p>
             <a:fld id="{9F50B6A4-EEFC-6D43-8633-B920B387D5FF}" type="datetimeFigureOut">
               <a:rPr lang="en-US" smtClean="0"/>
-              <a:t>21/09/15</a:t>
+              <a:t>21/10/15</a:t>
             </a:fld>
             <a:endParaRPr lang="en-GB"/>
           </a:p>
@@ -3428,7 +3430,7 @@
           <a:p>
             <a:fld id="{9F50B6A4-EEFC-6D43-8633-B920B387D5FF}" type="datetimeFigureOut">
               <a:rPr lang="en-US" smtClean="0"/>
-              <a:t>21/09/15</a:t>
+              <a:t>21/10/15</a:t>
             </a:fld>
             <a:endParaRPr lang="en-GB"/>
           </a:p>
@@ -4334,17 +4336,8 @@
             <a:pPr lvl="1"/>
             <a:r>
               <a:rPr lang="en-GB" dirty="0" smtClean="0"/>
-              <a:t>code generation (i.e., Petri </a:t>
-            </a:r>
-            <a:r>
-              <a:rPr lang="en-GB" dirty="0" smtClean="0"/>
-              <a:t>net </a:t>
-            </a:r>
-            <a:r>
-              <a:rPr lang="en-GB" dirty="0" smtClean="0"/>
-              <a:t>generation)</a:t>
-            </a:r>
-            <a:endParaRPr lang="en-GB" dirty="0" smtClean="0"/>
+              <a:t>code generation (i.e., Petri net generation)</a:t>
+            </a:r>
           </a:p>
         </p:txBody>
       </p:sp>
@@ -17669,90 +17662,69 @@
           <a:lstStyle/>
           <a:p>
             <a:r>
+              <a:rPr lang="en-GB" dirty="0"/>
+              <a:t>Implementation </a:t>
+            </a:r>
+            <a:r>
               <a:rPr lang="en-GB" dirty="0" smtClean="0"/>
-              <a:t>Performance</a:t>
+              <a:t>quality</a:t>
             </a:r>
             <a:endParaRPr lang="en-GB" dirty="0"/>
           </a:p>
         </p:txBody>
       </p:sp>
-      <p:pic>
-        <p:nvPicPr>
-          <p:cNvPr id="5" name="Picture 4" descr="performance.pdf"/>
-          <p:cNvPicPr>
-            <a:picLocks noChangeAspect="1"/>
-          </p:cNvPicPr>
-          <p:nvPr/>
-        </p:nvPicPr>
-        <p:blipFill>
-          <a:blip r:embed="rId2">
-            <a:extLst>
-              <a:ext uri="{28A0092B-C50C-407E-A947-70E740481C1C}">
-                <a14:useLocalDpi xmlns:a14="http://schemas.microsoft.com/office/drawing/2010/main" val="0"/>
-              </a:ext>
-            </a:extLst>
-          </a:blip>
-          <a:stretch>
-            <a:fillRect/>
-          </a:stretch>
-        </p:blipFill>
-        <p:spPr>
-          <a:xfrm>
-            <a:off x="129727" y="1910802"/>
-            <a:ext cx="8864323" cy="2036661"/>
-          </a:xfrm>
-          <a:prstGeom prst="rect">
-            <a:avLst/>
-          </a:prstGeom>
-        </p:spPr>
-      </p:pic>
       <p:sp>
         <p:nvSpPr>
-          <p:cNvPr id="8" name="TextBox 7"/>
-          <p:cNvSpPr txBox="1"/>
-          <p:nvPr/>
+          <p:cNvPr id="3" name="Content Placeholder 2"/>
+          <p:cNvSpPr>
+            <a:spLocks noGrp="1"/>
+          </p:cNvSpPr>
+          <p:nvPr>
+            <p:ph idx="1"/>
+          </p:nvPr>
         </p:nvSpPr>
-        <p:spPr>
-          <a:xfrm>
-            <a:off x="0" y="3981787"/>
-            <a:ext cx="9144000" cy="830997"/>
-          </a:xfrm>
-          <a:prstGeom prst="rect">
-            <a:avLst/>
-          </a:prstGeom>
-          <a:noFill/>
-        </p:spPr>
+        <p:spPr/>
         <p:txBody>
-          <a:bodyPr wrap="square" rtlCol="0">
-            <a:spAutoFit/>
+          <a:bodyPr>
+            <a:normAutofit fontScale="92500"/>
           </a:bodyPr>
           <a:lstStyle/>
           <a:p>
-            <a:pPr algn="ctr"/>
-            <a:r>
-              <a:rPr lang="en-GB" sz="2400" dirty="0" smtClean="0"/>
-              <a:t>execution times in </a:t>
-            </a:r>
-            <a:r>
-              <a:rPr lang="en-GB" sz="2400" dirty="0" err="1" smtClean="0"/>
-              <a:t>ms</a:t>
-            </a:r>
-            <a:endParaRPr lang="en-GB" sz="2400" dirty="0" smtClean="0"/>
-          </a:p>
-          <a:p>
-            <a:pPr algn="ctr"/>
-            <a:r>
-              <a:rPr lang="en-GB" sz="2400" dirty="0" smtClean="0"/>
-              <a:t>(cf. solution description)</a:t>
-            </a:r>
-            <a:endParaRPr lang="en-GB" sz="2400" dirty="0"/>
+            <a:r>
+              <a:rPr lang="en-GB" dirty="0" smtClean="0"/>
+              <a:t>straightforward rewriting thanks to attribute-based analysis (rewrites leverage on analyses)</a:t>
+            </a:r>
+          </a:p>
+          <a:p>
+            <a:r>
+              <a:rPr lang="en-GB" dirty="0" smtClean="0"/>
+              <a:t>focused rewriting (just actual state changes)</a:t>
+            </a:r>
+          </a:p>
+          <a:p>
+            <a:r>
+              <a:rPr lang="en-GB" dirty="0" smtClean="0"/>
+              <a:t>efficient, although naïvely specified (incremental)</a:t>
+            </a:r>
+          </a:p>
+          <a:p>
+            <a:r>
+              <a:rPr lang="en-GB" dirty="0" smtClean="0"/>
+              <a:t>declarative (automatic deduction of evaluation orders for intertwined analyses &amp; rewriting)</a:t>
+            </a:r>
+          </a:p>
+          <a:p>
+            <a:r>
+              <a:rPr lang="en-GB" dirty="0" smtClean="0"/>
+              <a:t>interactive (convenient runtime API for user-driven analyses &amp; state changes)</a:t>
+            </a:r>
           </a:p>
         </p:txBody>
       </p:sp>
     </p:spTree>
     <p:extLst>
       <p:ext uri="{BB962C8B-B14F-4D97-AF65-F5344CB8AC3E}">
-        <p14:creationId xmlns:p14="http://schemas.microsoft.com/office/powerpoint/2010/main" val="2872825342"/>
+        <p14:creationId xmlns:p14="http://schemas.microsoft.com/office/powerpoint/2010/main" val="3334663188"/>
       </p:ext>
     </p:extLst>
   </p:cSld>
@@ -17955,6 +17927,229 @@
 </file>
 
 <file path=ppt/slides/slide20.xml><?xml version="1.0" encoding="utf-8"?>
+<p:sld xmlns:a="http://schemas.openxmlformats.org/drawingml/2006/main" xmlns:r="http://schemas.openxmlformats.org/officeDocument/2006/relationships" xmlns:p="http://schemas.openxmlformats.org/presentationml/2006/main">
+  <p:cSld>
+    <p:spTree>
+      <p:nvGrpSpPr>
+        <p:cNvPr id="1" name=""/>
+        <p:cNvGrpSpPr/>
+        <p:nvPr/>
+      </p:nvGrpSpPr>
+      <p:grpSpPr>
+        <a:xfrm>
+          <a:off x="0" y="0"/>
+          <a:ext cx="0" cy="0"/>
+          <a:chOff x="0" y="0"/>
+          <a:chExt cx="0" cy="0"/>
+        </a:xfrm>
+      </p:grpSpPr>
+      <p:sp>
+        <p:nvSpPr>
+          <p:cNvPr id="2" name="Title 1"/>
+          <p:cNvSpPr>
+            <a:spLocks noGrp="1"/>
+          </p:cNvSpPr>
+          <p:nvPr>
+            <p:ph type="title"/>
+          </p:nvPr>
+        </p:nvSpPr>
+        <p:spPr/>
+        <p:txBody>
+          <a:bodyPr/>
+          <a:lstStyle/>
+          <a:p>
+            <a:r>
+              <a:rPr lang="en-GB" dirty="0" smtClean="0"/>
+              <a:t>Performance</a:t>
+            </a:r>
+            <a:endParaRPr lang="en-GB" dirty="0"/>
+          </a:p>
+        </p:txBody>
+      </p:sp>
+      <p:pic>
+        <p:nvPicPr>
+          <p:cNvPr id="5" name="Picture 4" descr="performance.pdf"/>
+          <p:cNvPicPr>
+            <a:picLocks noChangeAspect="1"/>
+          </p:cNvPicPr>
+          <p:nvPr/>
+        </p:nvPicPr>
+        <p:blipFill>
+          <a:blip r:embed="rId2">
+            <a:extLst>
+              <a:ext uri="{28A0092B-C50C-407E-A947-70E740481C1C}">
+                <a14:useLocalDpi xmlns:a14="http://schemas.microsoft.com/office/drawing/2010/main" val="0"/>
+              </a:ext>
+            </a:extLst>
+          </a:blip>
+          <a:stretch>
+            <a:fillRect/>
+          </a:stretch>
+        </p:blipFill>
+        <p:spPr>
+          <a:xfrm>
+            <a:off x="129727" y="1910802"/>
+            <a:ext cx="8864323" cy="2036661"/>
+          </a:xfrm>
+          <a:prstGeom prst="rect">
+            <a:avLst/>
+          </a:prstGeom>
+        </p:spPr>
+      </p:pic>
+      <p:sp>
+        <p:nvSpPr>
+          <p:cNvPr id="8" name="TextBox 7"/>
+          <p:cNvSpPr txBox="1"/>
+          <p:nvPr/>
+        </p:nvSpPr>
+        <p:spPr>
+          <a:xfrm>
+            <a:off x="0" y="3981787"/>
+            <a:ext cx="9144000" cy="830997"/>
+          </a:xfrm>
+          <a:prstGeom prst="rect">
+            <a:avLst/>
+          </a:prstGeom>
+          <a:noFill/>
+        </p:spPr>
+        <p:txBody>
+          <a:bodyPr wrap="square" rtlCol="0">
+            <a:spAutoFit/>
+          </a:bodyPr>
+          <a:lstStyle/>
+          <a:p>
+            <a:pPr algn="ctr"/>
+            <a:r>
+              <a:rPr lang="en-GB" sz="2400" dirty="0" smtClean="0"/>
+              <a:t>execution times in </a:t>
+            </a:r>
+            <a:r>
+              <a:rPr lang="en-GB" sz="2400" dirty="0" err="1" smtClean="0"/>
+              <a:t>ms</a:t>
+            </a:r>
+            <a:endParaRPr lang="en-GB" sz="2400" dirty="0" smtClean="0"/>
+          </a:p>
+          <a:p>
+            <a:pPr algn="ctr"/>
+            <a:r>
+              <a:rPr lang="en-GB" sz="2400" dirty="0" smtClean="0"/>
+              <a:t>(cf. solution description)</a:t>
+            </a:r>
+            <a:endParaRPr lang="en-GB" sz="2400" dirty="0"/>
+          </a:p>
+        </p:txBody>
+      </p:sp>
+    </p:spTree>
+    <p:extLst>
+      <p:ext uri="{BB962C8B-B14F-4D97-AF65-F5344CB8AC3E}">
+        <p14:creationId xmlns:p14="http://schemas.microsoft.com/office/powerpoint/2010/main" val="2872825342"/>
+      </p:ext>
+    </p:extLst>
+  </p:cSld>
+  <p:clrMapOvr>
+    <a:masterClrMapping/>
+  </p:clrMapOvr>
+  <p:timing>
+    <p:tnLst>
+      <p:par>
+        <p:cTn xmlns:p14="http://schemas.microsoft.com/office/powerpoint/2010/main" id="1" dur="indefinite" restart="never" nodeType="tmRoot"/>
+      </p:par>
+    </p:tnLst>
+  </p:timing>
+</p:sld>
+</file>
+
+<file path=ppt/slides/slide21.xml><?xml version="1.0" encoding="utf-8"?>
+<p:sld xmlns:a="http://schemas.openxmlformats.org/drawingml/2006/main" xmlns:r="http://schemas.openxmlformats.org/officeDocument/2006/relationships" xmlns:p="http://schemas.openxmlformats.org/presentationml/2006/main">
+  <p:cSld>
+    <p:spTree>
+      <p:nvGrpSpPr>
+        <p:cNvPr id="1" name=""/>
+        <p:cNvGrpSpPr/>
+        <p:nvPr/>
+      </p:nvGrpSpPr>
+      <p:grpSpPr>
+        <a:xfrm>
+          <a:off x="0" y="0"/>
+          <a:ext cx="0" cy="0"/>
+          <a:chOff x="0" y="0"/>
+          <a:chExt cx="0" cy="0"/>
+        </a:xfrm>
+      </p:grpSpPr>
+      <p:sp>
+        <p:nvSpPr>
+          <p:cNvPr id="2" name="Title 1"/>
+          <p:cNvSpPr>
+            <a:spLocks noGrp="1"/>
+          </p:cNvSpPr>
+          <p:nvPr>
+            <p:ph type="title"/>
+          </p:nvPr>
+        </p:nvSpPr>
+        <p:spPr/>
+        <p:txBody>
+          <a:bodyPr/>
+          <a:lstStyle/>
+          <a:p>
+            <a:r>
+              <a:rPr lang="en-GB" dirty="0" smtClean="0"/>
+              <a:t>Conclusion</a:t>
+            </a:r>
+            <a:endParaRPr lang="en-GB" dirty="0"/>
+          </a:p>
+        </p:txBody>
+      </p:sp>
+      <p:pic>
+        <p:nvPicPr>
+          <p:cNvPr id="5" name="Picture 4" descr="solution-award.pdf"/>
+          <p:cNvPicPr>
+            <a:picLocks noChangeAspect="1"/>
+          </p:cNvPicPr>
+          <p:nvPr/>
+        </p:nvPicPr>
+        <p:blipFill>
+          <a:blip r:embed="rId2">
+            <a:extLst>
+              <a:ext uri="{28A0092B-C50C-407E-A947-70E740481C1C}">
+                <a14:useLocalDpi xmlns:a14="http://schemas.microsoft.com/office/drawing/2010/main" val="0"/>
+              </a:ext>
+            </a:extLst>
+          </a:blip>
+          <a:stretch>
+            <a:fillRect/>
+          </a:stretch>
+        </p:blipFill>
+        <p:spPr>
+          <a:xfrm>
+            <a:off x="2786914" y="1305720"/>
+            <a:ext cx="3579611" cy="5065601"/>
+          </a:xfrm>
+          <a:prstGeom prst="rect">
+            <a:avLst/>
+          </a:prstGeom>
+        </p:spPr>
+      </p:pic>
+    </p:spTree>
+    <p:extLst>
+      <p:ext uri="{BB962C8B-B14F-4D97-AF65-F5344CB8AC3E}">
+        <p14:creationId xmlns:p14="http://schemas.microsoft.com/office/powerpoint/2010/main" val="1641817779"/>
+      </p:ext>
+    </p:extLst>
+  </p:cSld>
+  <p:clrMapOvr>
+    <a:masterClrMapping/>
+  </p:clrMapOvr>
+  <p:timing>
+    <p:tnLst>
+      <p:par>
+        <p:cTn xmlns:p14="http://schemas.microsoft.com/office/powerpoint/2010/main" id="1" dur="indefinite" restart="never" nodeType="tmRoot"/>
+      </p:par>
+    </p:tnLst>
+  </p:timing>
+</p:sld>
+</file>
+
+<file path=ppt/slides/slide22.xml><?xml version="1.0" encoding="utf-8"?>
 <p:sld xmlns:a="http://schemas.openxmlformats.org/drawingml/2006/main" xmlns:r="http://schemas.openxmlformats.org/officeDocument/2006/relationships" xmlns:p="http://schemas.openxmlformats.org/presentationml/2006/main">
   <p:cSld>
     <p:spTree>
@@ -23087,10 +23282,40 @@
           </a:p>
         </p:txBody>
       </p:sp>
+      <p:sp>
+        <p:nvSpPr>
+          <p:cNvPr id="82" name="TextBox 81"/>
+          <p:cNvSpPr txBox="1"/>
+          <p:nvPr/>
+        </p:nvSpPr>
+        <p:spPr>
+          <a:xfrm>
+            <a:off x="7731982" y="1875638"/>
+            <a:ext cx="1220707" cy="369332"/>
+          </a:xfrm>
+          <a:prstGeom prst="rect">
+            <a:avLst/>
+          </a:prstGeom>
+          <a:noFill/>
+        </p:spPr>
+        <p:txBody>
+          <a:bodyPr wrap="none" rtlCol="0">
+            <a:spAutoFit/>
+          </a:bodyPr>
+          <a:lstStyle/>
+          <a:p>
+            <a:r>
+              <a:rPr lang="en-GB" dirty="0" smtClean="0"/>
+              <a:t>declarative</a:t>
+            </a:r>
+            <a:endParaRPr lang="en-GB" dirty="0"/>
+          </a:p>
+        </p:txBody>
+      </p:sp>
     </p:spTree>
     <p:extLst>
       <p:ext uri="{BB962C8B-B14F-4D97-AF65-F5344CB8AC3E}">
-        <p14:creationId xmlns:p14="http://schemas.microsoft.com/office/powerpoint/2010/main" val="2065939023"/>
+        <p14:creationId xmlns:p14="http://schemas.microsoft.com/office/powerpoint/2010/main" val="122257325"/>
       </p:ext>
     </p:extLst>
   </p:cSld>
@@ -23831,11 +24056,7 @@
             </a:r>
             <a:r>
               <a:rPr lang="en-GB" dirty="0" smtClean="0"/>
-              <a:t> </a:t>
-            </a:r>
-            <a:r>
-              <a:rPr lang="en-GB" dirty="0" smtClean="0"/>
-              <a:t>+ </a:t>
+              <a:t> + </a:t>
             </a:r>
             <a:r>
               <a:rPr lang="en-GB" dirty="0" smtClean="0">
@@ -23845,21 +24066,12 @@
               </a:rPr>
               <a:t>graph rewriting</a:t>
             </a:r>
-            <a:endParaRPr lang="en-GB" dirty="0" smtClean="0">
-              <a:solidFill>
-                <a:srgbClr val="3366FF"/>
-              </a:solidFill>
-            </a:endParaRPr>
           </a:p>
           <a:p>
             <a:pPr lvl="1"/>
             <a:r>
               <a:rPr lang="en-GB" dirty="0" smtClean="0"/>
-              <a:t>reference attribute </a:t>
-            </a:r>
-            <a:r>
-              <a:rPr lang="en-GB" dirty="0" smtClean="0"/>
-              <a:t>grammar for declarative </a:t>
+              <a:t>reference attribute grammar for declarative </a:t>
             </a:r>
             <a:r>
               <a:rPr lang="en-GB" dirty="0" smtClean="0">
@@ -23886,7 +24098,11 @@
             </a:r>
             <a:r>
               <a:rPr lang="en-GB" dirty="0" smtClean="0"/>
-              <a:t>graph on top of abstract syntax tree (AST)</a:t>
+              <a:t>graph on top of abstract syntax tree (AST</a:t>
+            </a:r>
+            <a:r>
+              <a:rPr lang="en-GB" dirty="0" smtClean="0"/>
+              <a:t>) &gt;&gt; extend AST to ASG</a:t>
             </a:r>
             <a:endParaRPr lang="en-GB" dirty="0"/>
           </a:p>
@@ -23928,23 +24144,14 @@
             </a:r>
             <a:r>
               <a:rPr lang="en-GB" dirty="0" smtClean="0"/>
-              <a:t> </a:t>
-            </a:r>
+              <a:t> abstract syntax graph (ASG)</a:t>
+            </a:r>
+          </a:p>
+          <a:p>
+            <a:pPr lvl="1"/>
             <a:r>
               <a:rPr lang="en-GB" dirty="0" smtClean="0"/>
-              <a:t>abstract syntax graph (ASG)</a:t>
-            </a:r>
-            <a:endParaRPr lang="en-GB" dirty="0" smtClean="0"/>
-          </a:p>
-          <a:p>
-            <a:pPr lvl="1"/>
-            <a:r>
-              <a:rPr lang="en-GB" dirty="0" smtClean="0"/>
-              <a:t>graph rewriting for </a:t>
-            </a:r>
-            <a:r>
-              <a:rPr lang="en-GB" dirty="0" smtClean="0"/>
-              <a:t>ASG </a:t>
+              <a:t>graph rewriting for ASG </a:t>
             </a:r>
             <a:r>
               <a:rPr lang="en-GB" dirty="0" smtClean="0">
@@ -24001,11 +24208,7 @@
             <a:pPr lvl="2"/>
             <a:r>
               <a:rPr lang="en-GB" dirty="0" smtClean="0"/>
-              <a:t>use </a:t>
-            </a:r>
-            <a:r>
-              <a:rPr lang="en-GB" dirty="0" smtClean="0"/>
-              <a:t>of analyses to deduce rewrites</a:t>
+              <a:t>use of analyses to deduce rewrites</a:t>
             </a:r>
           </a:p>
           <a:p>

</xml_diff>

<commit_message>
Examples (sle-2015 and ttc-2015-fuml-activity-diagrams documentation): Updated address data.
</commit_message>
<xml_diff>
--- a/examples/ttc-2015-fuml-activity-diagrams/documentation/figures/solution-presentation.pptx
+++ b/examples/ttc-2015-fuml-activity-diagrams/documentation/figures/solution-presentation.pptx
@@ -213,7 +213,7 @@
           <a:p>
             <a:fld id="{2DC44254-5F95-204D-8F07-2678B782EA19}" type="datetimeFigureOut">
               <a:rPr lang="en-US" smtClean="0"/>
-              <a:t>11/05/16</a:t>
+              <a:t>16/05/16</a:t>
             </a:fld>
             <a:endParaRPr lang="en-GB"/>
           </a:p>
@@ -998,7 +998,7 @@
           <a:p>
             <a:fld id="{9F50B6A4-EEFC-6D43-8633-B920B387D5FF}" type="datetimeFigureOut">
               <a:rPr lang="en-US" smtClean="0"/>
-              <a:t>11/05/16</a:t>
+              <a:t>16/05/16</a:t>
             </a:fld>
             <a:endParaRPr lang="en-GB"/>
           </a:p>
@@ -1168,7 +1168,7 @@
           <a:p>
             <a:fld id="{9F50B6A4-EEFC-6D43-8633-B920B387D5FF}" type="datetimeFigureOut">
               <a:rPr lang="en-US" smtClean="0"/>
-              <a:t>11/05/16</a:t>
+              <a:t>16/05/16</a:t>
             </a:fld>
             <a:endParaRPr lang="en-GB"/>
           </a:p>
@@ -1348,7 +1348,7 @@
           <a:p>
             <a:fld id="{9F50B6A4-EEFC-6D43-8633-B920B387D5FF}" type="datetimeFigureOut">
               <a:rPr lang="en-US" smtClean="0"/>
-              <a:t>11/05/16</a:t>
+              <a:t>16/05/16</a:t>
             </a:fld>
             <a:endParaRPr lang="en-GB"/>
           </a:p>
@@ -1518,7 +1518,7 @@
           <a:p>
             <a:fld id="{9F50B6A4-EEFC-6D43-8633-B920B387D5FF}" type="datetimeFigureOut">
               <a:rPr lang="en-US" smtClean="0"/>
-              <a:t>11/05/16</a:t>
+              <a:t>16/05/16</a:t>
             </a:fld>
             <a:endParaRPr lang="en-GB"/>
           </a:p>
@@ -1764,7 +1764,7 @@
           <a:p>
             <a:fld id="{9F50B6A4-EEFC-6D43-8633-B920B387D5FF}" type="datetimeFigureOut">
               <a:rPr lang="en-US" smtClean="0"/>
-              <a:t>11/05/16</a:t>
+              <a:t>16/05/16</a:t>
             </a:fld>
             <a:endParaRPr lang="en-GB"/>
           </a:p>
@@ -2052,7 +2052,7 @@
           <a:p>
             <a:fld id="{9F50B6A4-EEFC-6D43-8633-B920B387D5FF}" type="datetimeFigureOut">
               <a:rPr lang="en-US" smtClean="0"/>
-              <a:t>11/05/16</a:t>
+              <a:t>16/05/16</a:t>
             </a:fld>
             <a:endParaRPr lang="en-GB"/>
           </a:p>
@@ -2474,7 +2474,7 @@
           <a:p>
             <a:fld id="{9F50B6A4-EEFC-6D43-8633-B920B387D5FF}" type="datetimeFigureOut">
               <a:rPr lang="en-US" smtClean="0"/>
-              <a:t>11/05/16</a:t>
+              <a:t>16/05/16</a:t>
             </a:fld>
             <a:endParaRPr lang="en-GB"/>
           </a:p>
@@ -2592,7 +2592,7 @@
           <a:p>
             <a:fld id="{9F50B6A4-EEFC-6D43-8633-B920B387D5FF}" type="datetimeFigureOut">
               <a:rPr lang="en-US" smtClean="0"/>
-              <a:t>11/05/16</a:t>
+              <a:t>16/05/16</a:t>
             </a:fld>
             <a:endParaRPr lang="en-GB"/>
           </a:p>
@@ -2687,7 +2687,7 @@
           <a:p>
             <a:fld id="{9F50B6A4-EEFC-6D43-8633-B920B387D5FF}" type="datetimeFigureOut">
               <a:rPr lang="en-US" smtClean="0"/>
-              <a:t>11/05/16</a:t>
+              <a:t>16/05/16</a:t>
             </a:fld>
             <a:endParaRPr lang="en-GB"/>
           </a:p>
@@ -2964,7 +2964,7 @@
           <a:p>
             <a:fld id="{9F50B6A4-EEFC-6D43-8633-B920B387D5FF}" type="datetimeFigureOut">
               <a:rPr lang="en-US" smtClean="0"/>
-              <a:t>11/05/16</a:t>
+              <a:t>16/05/16</a:t>
             </a:fld>
             <a:endParaRPr lang="en-GB"/>
           </a:p>
@@ -3217,7 +3217,7 @@
           <a:p>
             <a:fld id="{9F50B6A4-EEFC-6D43-8633-B920B387D5FF}" type="datetimeFigureOut">
               <a:rPr lang="en-US" smtClean="0"/>
-              <a:t>11/05/16</a:t>
+              <a:t>16/05/16</a:t>
             </a:fld>
             <a:endParaRPr lang="en-GB"/>
           </a:p>
@@ -3430,7 +3430,7 @@
           <a:p>
             <a:fld id="{9F50B6A4-EEFC-6D43-8633-B920B387D5FF}" type="datetimeFigureOut">
               <a:rPr lang="en-US" smtClean="0"/>
-              <a:t>11/05/16</a:t>
+              <a:t>16/05/16</a:t>
             </a:fld>
             <a:endParaRPr lang="en-GB"/>
           </a:p>
@@ -4984,7 +4984,7 @@
           <a:p>
             <a:r>
               <a:rPr lang="en-GB" dirty="0" smtClean="0"/>
-              <a:t>ASG</a:t>
+              <a:t>Abstract syntax graph</a:t>
             </a:r>
             <a:endParaRPr lang="en-GB" dirty="0"/>
           </a:p>
@@ -18019,6 +18019,143 @@
           </a:prstGeom>
         </p:spPr>
       </p:pic>
+      <p:cxnSp>
+        <p:nvCxnSpPr>
+          <p:cNvPr id="7" name="Gerade Verbindung 72" descr=" 700"/>
+          <p:cNvCxnSpPr>
+            <a:cxnSpLocks noChangeShapeType="1"/>
+          </p:cNvCxnSpPr>
+          <p:nvPr/>
+        </p:nvCxnSpPr>
+        <p:spPr bwMode="auto">
+          <a:xfrm>
+            <a:off x="4219758" y="5260633"/>
+            <a:ext cx="27861" cy="0"/>
+          </a:xfrm>
+          <a:prstGeom prst="line">
+            <a:avLst/>
+          </a:prstGeom>
+          <a:noFill/>
+          <a:ln w="8890">
+            <a:solidFill>
+              <a:schemeClr val="tx1">
+                <a:lumMod val="50000"/>
+                <a:lumOff val="50000"/>
+              </a:schemeClr>
+            </a:solidFill>
+            <a:round/>
+            <a:headEnd/>
+            <a:tailEnd/>
+          </a:ln>
+          <a:extLst>
+            <a:ext uri="{909E8E84-426E-40dd-AFC4-6F175D3DCCD1}">
+              <a14:hiddenFill xmlns:a14="http://schemas.microsoft.com/office/drawing/2010/main">
+                <a:noFill/>
+              </a14:hiddenFill>
+            </a:ext>
+          </a:extLst>
+        </p:spPr>
+      </p:cxnSp>
+      <p:sp>
+        <p:nvSpPr>
+          <p:cNvPr id="11" name="Oval 10"/>
+          <p:cNvSpPr/>
+          <p:nvPr/>
+        </p:nvSpPr>
+        <p:spPr>
+          <a:xfrm>
+            <a:off x="7188201" y="4029075"/>
+            <a:ext cx="1663700" cy="644525"/>
+          </a:xfrm>
+          <a:prstGeom prst="ellipse">
+            <a:avLst/>
+          </a:prstGeom>
+          <a:solidFill>
+            <a:srgbClr val="660066">
+              <a:alpha val="20000"/>
+            </a:srgbClr>
+          </a:solidFill>
+          <a:ln w="44450">
+            <a:solidFill>
+              <a:srgbClr val="660066"/>
+            </a:solidFill>
+            <a:prstDash val="sysDot"/>
+          </a:ln>
+        </p:spPr>
+        <p:style>
+          <a:lnRef idx="1">
+            <a:schemeClr val="accent1"/>
+          </a:lnRef>
+          <a:fillRef idx="3">
+            <a:schemeClr val="accent1"/>
+          </a:fillRef>
+          <a:effectRef idx="2">
+            <a:schemeClr val="accent1"/>
+          </a:effectRef>
+          <a:fontRef idx="minor">
+            <a:schemeClr val="lt1"/>
+          </a:fontRef>
+        </p:style>
+        <p:txBody>
+          <a:bodyPr rtlCol="0" anchor="ctr"/>
+          <a:lstStyle/>
+          <a:p>
+            <a:pPr algn="ctr"/>
+            <a:endParaRPr lang="en-GB"/>
+          </a:p>
+        </p:txBody>
+      </p:sp>
+      <p:sp>
+        <p:nvSpPr>
+          <p:cNvPr id="12" name="Rectangular Callout 11"/>
+          <p:cNvSpPr/>
+          <p:nvPr/>
+        </p:nvSpPr>
+        <p:spPr>
+          <a:xfrm>
+            <a:off x="6400801" y="5071568"/>
+            <a:ext cx="2247900" cy="1062532"/>
+          </a:xfrm>
+          <a:prstGeom prst="wedgeRectCallout">
+            <a:avLst>
+              <a:gd name="adj1" fmla="val 21812"/>
+              <a:gd name="adj2" fmla="val -85167"/>
+            </a:avLst>
+          </a:prstGeom>
+          <a:solidFill>
+            <a:srgbClr val="660066"/>
+          </a:solidFill>
+          <a:ln>
+            <a:noFill/>
+          </a:ln>
+        </p:spPr>
+        <p:style>
+          <a:lnRef idx="1">
+            <a:schemeClr val="accent1"/>
+          </a:lnRef>
+          <a:fillRef idx="3">
+            <a:schemeClr val="accent1"/>
+          </a:fillRef>
+          <a:effectRef idx="2">
+            <a:schemeClr val="accent1"/>
+          </a:effectRef>
+          <a:fontRef idx="minor">
+            <a:schemeClr val="lt1"/>
+          </a:fontRef>
+        </p:style>
+        <p:txBody>
+          <a:bodyPr rtlCol="0" anchor="ctr"/>
+          <a:lstStyle/>
+          <a:p>
+            <a:pPr algn="ctr"/>
+            <a:r>
+              <a:rPr lang="en-GB" dirty="0" smtClean="0"/>
+              <a:t>time saved by incremental evaluation</a:t>
+            </a:r>
+            <a:endParaRPr lang="en-GB" dirty="0"/>
+          </a:p>
+        </p:txBody>
+      </p:sp>
     </p:spTree>
     <p:extLst>
       <p:ext uri="{BB962C8B-B14F-4D97-AF65-F5344CB8AC3E}">
@@ -18032,9 +18169,124 @@
   <p:timing>
     <p:tnLst>
       <p:par>
-        <p:cTn xmlns:p14="http://schemas.microsoft.com/office/powerpoint/2010/main" id="1" dur="indefinite" restart="never" nodeType="tmRoot"/>
+        <p:cTn xmlns:p14="http://schemas.microsoft.com/office/powerpoint/2010/main" id="1" dur="indefinite" restart="never" nodeType="tmRoot">
+          <p:childTnLst>
+            <p:seq concurrent="1" nextAc="seek">
+              <p:cTn id="2" dur="indefinite" nodeType="mainSeq">
+                <p:childTnLst>
+                  <p:par>
+                    <p:cTn id="3" fill="hold">
+                      <p:stCondLst>
+                        <p:cond delay="indefinite"/>
+                      </p:stCondLst>
+                      <p:childTnLst>
+                        <p:par>
+                          <p:cTn id="4" fill="hold">
+                            <p:stCondLst>
+                              <p:cond delay="0"/>
+                            </p:stCondLst>
+                            <p:childTnLst>
+                              <p:par>
+                                <p:cTn id="5" presetID="9" presetClass="entr" presetSubtype="0" fill="hold" grpId="0" nodeType="clickEffect">
+                                  <p:stCondLst>
+                                    <p:cond delay="0"/>
+                                  </p:stCondLst>
+                                  <p:childTnLst>
+                                    <p:set>
+                                      <p:cBhvr>
+                                        <p:cTn id="6" dur="1" fill="hold">
+                                          <p:stCondLst>
+                                            <p:cond delay="0"/>
+                                          </p:stCondLst>
+                                        </p:cTn>
+                                        <p:tgtEl>
+                                          <p:spTgt spid="12"/>
+                                        </p:tgtEl>
+                                        <p:attrNameLst>
+                                          <p:attrName>style.visibility</p:attrName>
+                                        </p:attrNameLst>
+                                      </p:cBhvr>
+                                      <p:to>
+                                        <p:strVal val="visible"/>
+                                      </p:to>
+                                    </p:set>
+                                    <p:animEffect transition="in" filter="dissolve">
+                                      <p:cBhvr>
+                                        <p:cTn id="7" dur="500"/>
+                                        <p:tgtEl>
+                                          <p:spTgt spid="12"/>
+                                        </p:tgtEl>
+                                      </p:cBhvr>
+                                    </p:animEffect>
+                                  </p:childTnLst>
+                                </p:cTn>
+                              </p:par>
+                              <p:par>
+                                <p:cTn id="8" presetID="9" presetClass="entr" presetSubtype="0" fill="hold" grpId="0" nodeType="withEffect">
+                                  <p:stCondLst>
+                                    <p:cond delay="0"/>
+                                  </p:stCondLst>
+                                  <p:childTnLst>
+                                    <p:set>
+                                      <p:cBhvr>
+                                        <p:cTn id="9" dur="1" fill="hold">
+                                          <p:stCondLst>
+                                            <p:cond delay="0"/>
+                                          </p:stCondLst>
+                                        </p:cTn>
+                                        <p:tgtEl>
+                                          <p:spTgt spid="11"/>
+                                        </p:tgtEl>
+                                        <p:attrNameLst>
+                                          <p:attrName>style.visibility</p:attrName>
+                                        </p:attrNameLst>
+                                      </p:cBhvr>
+                                      <p:to>
+                                        <p:strVal val="visible"/>
+                                      </p:to>
+                                    </p:set>
+                                    <p:animEffect transition="in" filter="dissolve">
+                                      <p:cBhvr>
+                                        <p:cTn id="10" dur="500"/>
+                                        <p:tgtEl>
+                                          <p:spTgt spid="11"/>
+                                        </p:tgtEl>
+                                      </p:cBhvr>
+                                    </p:animEffect>
+                                  </p:childTnLst>
+                                </p:cTn>
+                              </p:par>
+                            </p:childTnLst>
+                          </p:cTn>
+                        </p:par>
+                      </p:childTnLst>
+                    </p:cTn>
+                  </p:par>
+                </p:childTnLst>
+              </p:cTn>
+              <p:prevCondLst>
+                <p:cond evt="onPrev" delay="0">
+                  <p:tgtEl>
+                    <p:sldTgt/>
+                  </p:tgtEl>
+                </p:cond>
+              </p:prevCondLst>
+              <p:nextCondLst>
+                <p:cond evt="onNext" delay="0">
+                  <p:tgtEl>
+                    <p:sldTgt/>
+                  </p:tgtEl>
+                </p:cond>
+              </p:nextCondLst>
+            </p:seq>
+          </p:childTnLst>
+        </p:cTn>
       </p:par>
     </p:tnLst>
+    <p:bldLst>
+      <p:bldP spid="11" grpId="0" animBg="1"/>
+      <p:bldP spid="12" grpId="0" animBg="1"/>
+    </p:bldLst>
   </p:timing>
 </p:sld>
 </file>
@@ -23818,7 +24070,11 @@
             <a:pPr lvl="1"/>
             <a:r>
               <a:rPr lang="en-GB" dirty="0" smtClean="0"/>
-              <a:t>graph rewriting for ASG </a:t>
+              <a:t>graph rewriting for </a:t>
+            </a:r>
+            <a:r>
+              <a:rPr lang="en-GB" dirty="0" smtClean="0"/>
+              <a:t>declarative ASG </a:t>
             </a:r>
             <a:r>
               <a:rPr lang="en-GB" dirty="0" smtClean="0">

</xml_diff>

<commit_message>
Examples (ttc-2015-fuml-activity-diagrams documentation): Fixed minor spelling and consistency errors.
</commit_message>
<xml_diff>
--- a/examples/ttc-2015-fuml-activity-diagrams/documentation/figures/solution-presentation.pptx
+++ b/examples/ttc-2015-fuml-activity-diagrams/documentation/figures/solution-presentation.pptx
@@ -213,7 +213,7 @@
           <a:p>
             <a:fld id="{2DC44254-5F95-204D-8F07-2678B782EA19}" type="datetimeFigureOut">
               <a:rPr lang="en-US" smtClean="0"/>
-              <a:t>16/05/16</a:t>
+              <a:t>17/05/16</a:t>
             </a:fld>
             <a:endParaRPr lang="en-GB"/>
           </a:p>
@@ -998,7 +998,7 @@
           <a:p>
             <a:fld id="{9F50B6A4-EEFC-6D43-8633-B920B387D5FF}" type="datetimeFigureOut">
               <a:rPr lang="en-US" smtClean="0"/>
-              <a:t>16/05/16</a:t>
+              <a:t>17/05/16</a:t>
             </a:fld>
             <a:endParaRPr lang="en-GB"/>
           </a:p>
@@ -1168,7 +1168,7 @@
           <a:p>
             <a:fld id="{9F50B6A4-EEFC-6D43-8633-B920B387D5FF}" type="datetimeFigureOut">
               <a:rPr lang="en-US" smtClean="0"/>
-              <a:t>16/05/16</a:t>
+              <a:t>17/05/16</a:t>
             </a:fld>
             <a:endParaRPr lang="en-GB"/>
           </a:p>
@@ -1348,7 +1348,7 @@
           <a:p>
             <a:fld id="{9F50B6A4-EEFC-6D43-8633-B920B387D5FF}" type="datetimeFigureOut">
               <a:rPr lang="en-US" smtClean="0"/>
-              <a:t>16/05/16</a:t>
+              <a:t>17/05/16</a:t>
             </a:fld>
             <a:endParaRPr lang="en-GB"/>
           </a:p>
@@ -1518,7 +1518,7 @@
           <a:p>
             <a:fld id="{9F50B6A4-EEFC-6D43-8633-B920B387D5FF}" type="datetimeFigureOut">
               <a:rPr lang="en-US" smtClean="0"/>
-              <a:t>16/05/16</a:t>
+              <a:t>17/05/16</a:t>
             </a:fld>
             <a:endParaRPr lang="en-GB"/>
           </a:p>
@@ -1764,7 +1764,7 @@
           <a:p>
             <a:fld id="{9F50B6A4-EEFC-6D43-8633-B920B387D5FF}" type="datetimeFigureOut">
               <a:rPr lang="en-US" smtClean="0"/>
-              <a:t>16/05/16</a:t>
+              <a:t>17/05/16</a:t>
             </a:fld>
             <a:endParaRPr lang="en-GB"/>
           </a:p>
@@ -2052,7 +2052,7 @@
           <a:p>
             <a:fld id="{9F50B6A4-EEFC-6D43-8633-B920B387D5FF}" type="datetimeFigureOut">
               <a:rPr lang="en-US" smtClean="0"/>
-              <a:t>16/05/16</a:t>
+              <a:t>17/05/16</a:t>
             </a:fld>
             <a:endParaRPr lang="en-GB"/>
           </a:p>
@@ -2474,7 +2474,7 @@
           <a:p>
             <a:fld id="{9F50B6A4-EEFC-6D43-8633-B920B387D5FF}" type="datetimeFigureOut">
               <a:rPr lang="en-US" smtClean="0"/>
-              <a:t>16/05/16</a:t>
+              <a:t>17/05/16</a:t>
             </a:fld>
             <a:endParaRPr lang="en-GB"/>
           </a:p>
@@ -2592,7 +2592,7 @@
           <a:p>
             <a:fld id="{9F50B6A4-EEFC-6D43-8633-B920B387D5FF}" type="datetimeFigureOut">
               <a:rPr lang="en-US" smtClean="0"/>
-              <a:t>16/05/16</a:t>
+              <a:t>17/05/16</a:t>
             </a:fld>
             <a:endParaRPr lang="en-GB"/>
           </a:p>
@@ -2687,7 +2687,7 @@
           <a:p>
             <a:fld id="{9F50B6A4-EEFC-6D43-8633-B920B387D5FF}" type="datetimeFigureOut">
               <a:rPr lang="en-US" smtClean="0"/>
-              <a:t>16/05/16</a:t>
+              <a:t>17/05/16</a:t>
             </a:fld>
             <a:endParaRPr lang="en-GB"/>
           </a:p>
@@ -2964,7 +2964,7 @@
           <a:p>
             <a:fld id="{9F50B6A4-EEFC-6D43-8633-B920B387D5FF}" type="datetimeFigureOut">
               <a:rPr lang="en-US" smtClean="0"/>
-              <a:t>16/05/16</a:t>
+              <a:t>17/05/16</a:t>
             </a:fld>
             <a:endParaRPr lang="en-GB"/>
           </a:p>
@@ -3217,7 +3217,7 @@
           <a:p>
             <a:fld id="{9F50B6A4-EEFC-6D43-8633-B920B387D5FF}" type="datetimeFigureOut">
               <a:rPr lang="en-US" smtClean="0"/>
-              <a:t>16/05/16</a:t>
+              <a:t>17/05/16</a:t>
             </a:fld>
             <a:endParaRPr lang="en-GB"/>
           </a:p>
@@ -3430,7 +3430,7 @@
           <a:p>
             <a:fld id="{9F50B6A4-EEFC-6D43-8633-B920B387D5FF}" type="datetimeFigureOut">
               <a:rPr lang="en-US" smtClean="0"/>
-              <a:t>16/05/16</a:t>
+              <a:t>17/05/16</a:t>
             </a:fld>
             <a:endParaRPr lang="en-GB"/>
           </a:p>
@@ -17794,7 +17794,7 @@
       </p:sp>
       <p:pic>
         <p:nvPicPr>
-          <p:cNvPr id="4" name="Picture 3" descr="Pages from solution-description.pdf"/>
+          <p:cNvPr id="5" name="Picture 4" descr="Pages from solution-presentation.pdf"/>
           <p:cNvPicPr>
             <a:picLocks noChangeAspect="1"/>
           </p:cNvPicPr>
@@ -17814,8 +17814,8 @@
         </p:blipFill>
         <p:spPr>
           <a:xfrm>
-            <a:off x="457200" y="1219200"/>
-            <a:ext cx="8229600" cy="4937760"/>
+            <a:off x="546100" y="1303338"/>
+            <a:ext cx="8124534" cy="4867562"/>
           </a:xfrm>
           <a:prstGeom prst="rect">
             <a:avLst/>
@@ -24070,11 +24070,7 @@
             <a:pPr lvl="1"/>
             <a:r>
               <a:rPr lang="en-GB" dirty="0" smtClean="0"/>
-              <a:t>graph rewriting for </a:t>
-            </a:r>
-            <a:r>
-              <a:rPr lang="en-GB" dirty="0" smtClean="0"/>
-              <a:t>declarative ASG </a:t>
+              <a:t>graph rewriting for declarative ASG </a:t>
             </a:r>
             <a:r>
               <a:rPr lang="en-GB" dirty="0" smtClean="0">

</xml_diff>